<commit_message>
Modification finale support de formation
</commit_message>
<xml_diff>
--- a/Support de formation - ARSM -vf.PPTX
+++ b/Support de formation - ARSM -vf.PPTX
@@ -2776,7 +2776,7 @@
           <p:cNvPr id="2" name="Espace réservé de l'en-tête 1">
             <a:extLst>
               <a:ext uri="{FF2B5EF4-FFF2-40B4-BE49-F238E27FC236}">
-                <a16:creationId xmlns="" xmlns:a16="http://schemas.microsoft.com/office/drawing/2014/main" id="{3F368B05-2D38-44D6-B8DA-599D4A9E42B7}"/>
+                <a16:creationId xmlns:a16="http://schemas.microsoft.com/office/drawing/2014/main" xmlns="" id="{3F368B05-2D38-44D6-B8DA-599D4A9E42B7}"/>
               </a:ext>
             </a:extLst>
           </p:cNvPr>
@@ -2813,7 +2813,7 @@
           <p:cNvPr id="3" name="Espace réservé de la date 2">
             <a:extLst>
               <a:ext uri="{FF2B5EF4-FFF2-40B4-BE49-F238E27FC236}">
-                <a16:creationId xmlns="" xmlns:a16="http://schemas.microsoft.com/office/drawing/2014/main" id="{2681012A-122D-475C-A900-C31EAF4E1915}"/>
+                <a16:creationId xmlns:a16="http://schemas.microsoft.com/office/drawing/2014/main" xmlns="" id="{2681012A-122D-475C-A900-C31EAF4E1915}"/>
               </a:ext>
             </a:extLst>
           </p:cNvPr>
@@ -2854,7 +2854,7 @@
           <p:cNvPr id="4" name="Espace réservé du pied de page 3">
             <a:extLst>
               <a:ext uri="{FF2B5EF4-FFF2-40B4-BE49-F238E27FC236}">
-                <a16:creationId xmlns="" xmlns:a16="http://schemas.microsoft.com/office/drawing/2014/main" id="{82554434-9A0E-4261-9D33-B9B86CA7C17D}"/>
+                <a16:creationId xmlns:a16="http://schemas.microsoft.com/office/drawing/2014/main" xmlns="" id="{82554434-9A0E-4261-9D33-B9B86CA7C17D}"/>
               </a:ext>
             </a:extLst>
           </p:cNvPr>
@@ -2891,7 +2891,7 @@
           <p:cNvPr id="5" name="Espace réservé du numéro de diapositive 4">
             <a:extLst>
               <a:ext uri="{FF2B5EF4-FFF2-40B4-BE49-F238E27FC236}">
-                <a16:creationId xmlns="" xmlns:a16="http://schemas.microsoft.com/office/drawing/2014/main" id="{9F980ABD-941E-484C-95AE-BBA0656FBE27}"/>
+                <a16:creationId xmlns:a16="http://schemas.microsoft.com/office/drawing/2014/main" xmlns="" id="{9F980ABD-941E-484C-95AE-BBA0656FBE27}"/>
               </a:ext>
             </a:extLst>
           </p:cNvPr>
@@ -4189,7 +4189,7 @@
           <a:noFill/>
           <a:extLst>
             <a:ext uri="{909E8E84-426E-40dd-AFC4-6F175D3DCCD1}">
-              <a14:hiddenFill xmlns:a14="http://schemas.microsoft.com/office/drawing/2010/main" xmlns="">
+              <a14:hiddenFill xmlns="" xmlns:a14="http://schemas.microsoft.com/office/drawing/2010/main">
                 <a:solidFill>
                   <a:srgbClr val="FFFFFF"/>
                 </a:solidFill>
@@ -4248,7 +4248,7 @@
             </a:ln>
             <a:extLst>
               <a:ext uri="{91240B29-F687-4f45-9708-019B960494DF}">
-                <a14:hiddenLine xmlns:a14="http://schemas.microsoft.com/office/drawing/2010/main" xmlns="" w="9525">
+                <a14:hiddenLine xmlns="" xmlns:a14="http://schemas.microsoft.com/office/drawing/2010/main" w="9525">
                   <a:solidFill>
                     <a:srgbClr val="000000"/>
                   </a:solidFill>
@@ -4338,7 +4338,7 @@
             </a:ln>
             <a:extLst>
               <a:ext uri="{91240B29-F687-4f45-9708-019B960494DF}">
-                <a14:hiddenLine xmlns:a14="http://schemas.microsoft.com/office/drawing/2010/main" xmlns="" w="9525">
+                <a14:hiddenLine xmlns="" xmlns:a14="http://schemas.microsoft.com/office/drawing/2010/main" w="9525">
                   <a:solidFill>
                     <a:srgbClr val="000000"/>
                   </a:solidFill>
@@ -4428,7 +4428,7 @@
             </a:ln>
             <a:extLst>
               <a:ext uri="{91240B29-F687-4f45-9708-019B960494DF}">
-                <a14:hiddenLine xmlns:a14="http://schemas.microsoft.com/office/drawing/2010/main" xmlns="" w="9525">
+                <a14:hiddenLine xmlns="" xmlns:a14="http://schemas.microsoft.com/office/drawing/2010/main" w="9525">
                   <a:solidFill>
                     <a:srgbClr val="000000"/>
                   </a:solidFill>
@@ -4462,7 +4462,7 @@
             </a:ln>
             <a:extLst>
               <a:ext uri="{91240B29-F687-4f45-9708-019B960494DF}">
-                <a14:hiddenLine xmlns:a14="http://schemas.microsoft.com/office/drawing/2010/main" xmlns="" w="9525">
+                <a14:hiddenLine xmlns="" xmlns:a14="http://schemas.microsoft.com/office/drawing/2010/main" w="9525">
                   <a:solidFill>
                     <a:srgbClr val="000000"/>
                   </a:solidFill>
@@ -4552,7 +4552,7 @@
             </a:ln>
             <a:extLst>
               <a:ext uri="{91240B29-F687-4f45-9708-019B960494DF}">
-                <a14:hiddenLine xmlns:a14="http://schemas.microsoft.com/office/drawing/2010/main" xmlns="" w="9525">
+                <a14:hiddenLine xmlns="" xmlns:a14="http://schemas.microsoft.com/office/drawing/2010/main" w="9525">
                   <a:solidFill>
                     <a:srgbClr val="000000"/>
                   </a:solidFill>
@@ -4614,7 +4614,7 @@
             </a:ln>
             <a:extLst>
               <a:ext uri="{91240B29-F687-4f45-9708-019B960494DF}">
-                <a14:hiddenLine xmlns:a14="http://schemas.microsoft.com/office/drawing/2010/main" xmlns="" w="9525">
+                <a14:hiddenLine xmlns="" xmlns:a14="http://schemas.microsoft.com/office/drawing/2010/main" w="9525">
                   <a:solidFill>
                     <a:srgbClr val="000000"/>
                   </a:solidFill>
@@ -4676,7 +4676,7 @@
             </a:ln>
             <a:extLst>
               <a:ext uri="{91240B29-F687-4f45-9708-019B960494DF}">
-                <a14:hiddenLine xmlns:a14="http://schemas.microsoft.com/office/drawing/2010/main" xmlns="" w="9525">
+                <a14:hiddenLine xmlns="" xmlns:a14="http://schemas.microsoft.com/office/drawing/2010/main" w="9525">
                   <a:solidFill>
                     <a:srgbClr val="000000"/>
                   </a:solidFill>
@@ -4766,7 +4766,7 @@
             </a:ln>
             <a:extLst>
               <a:ext uri="{91240B29-F687-4f45-9708-019B960494DF}">
-                <a14:hiddenLine xmlns:a14="http://schemas.microsoft.com/office/drawing/2010/main" xmlns="" w="9525">
+                <a14:hiddenLine xmlns="" xmlns:a14="http://schemas.microsoft.com/office/drawing/2010/main" w="9525">
                   <a:solidFill>
                     <a:srgbClr val="000000"/>
                   </a:solidFill>
@@ -4828,7 +4828,7 @@
             </a:ln>
             <a:extLst>
               <a:ext uri="{91240B29-F687-4f45-9708-019B960494DF}">
-                <a14:hiddenLine xmlns:a14="http://schemas.microsoft.com/office/drawing/2010/main" xmlns="" w="9525">
+                <a14:hiddenLine xmlns="" xmlns:a14="http://schemas.microsoft.com/office/drawing/2010/main" w="9525">
                   <a:solidFill>
                     <a:srgbClr val="000000"/>
                   </a:solidFill>
@@ -4890,7 +4890,7 @@
             </a:ln>
             <a:extLst>
               <a:ext uri="{91240B29-F687-4f45-9708-019B960494DF}">
-                <a14:hiddenLine xmlns:a14="http://schemas.microsoft.com/office/drawing/2010/main" xmlns="" w="9525">
+                <a14:hiddenLine xmlns="" xmlns:a14="http://schemas.microsoft.com/office/drawing/2010/main" w="9525">
                   <a:solidFill>
                     <a:srgbClr val="000000"/>
                   </a:solidFill>
@@ -4980,7 +4980,7 @@
             </a:ln>
             <a:extLst>
               <a:ext uri="{91240B29-F687-4f45-9708-019B960494DF}">
-                <a14:hiddenLine xmlns:a14="http://schemas.microsoft.com/office/drawing/2010/main" xmlns="" w="9525">
+                <a14:hiddenLine xmlns="" xmlns:a14="http://schemas.microsoft.com/office/drawing/2010/main" w="9525">
                   <a:solidFill>
                     <a:srgbClr val="000000"/>
                   </a:solidFill>
@@ -5070,7 +5070,7 @@
             </a:ln>
             <a:extLst>
               <a:ext uri="{91240B29-F687-4f45-9708-019B960494DF}">
-                <a14:hiddenLine xmlns:a14="http://schemas.microsoft.com/office/drawing/2010/main" xmlns="" w="9525">
+                <a14:hiddenLine xmlns="" xmlns:a14="http://schemas.microsoft.com/office/drawing/2010/main" w="9525">
                   <a:solidFill>
                     <a:srgbClr val="000000"/>
                   </a:solidFill>
@@ -5132,7 +5132,7 @@
             </a:ln>
             <a:extLst>
               <a:ext uri="{91240B29-F687-4f45-9708-019B960494DF}">
-                <a14:hiddenLine xmlns:a14="http://schemas.microsoft.com/office/drawing/2010/main" xmlns="" w="9525">
+                <a14:hiddenLine xmlns="" xmlns:a14="http://schemas.microsoft.com/office/drawing/2010/main" w="9525">
                   <a:solidFill>
                     <a:srgbClr val="000000"/>
                   </a:solidFill>
@@ -5242,7 +5242,7 @@
             </a:ln>
             <a:extLst>
               <a:ext uri="{91240B29-F687-4f45-9708-019B960494DF}">
-                <a14:hiddenLine xmlns:a14="http://schemas.microsoft.com/office/drawing/2010/main" xmlns="" w="9525">
+                <a14:hiddenLine xmlns="" xmlns:a14="http://schemas.microsoft.com/office/drawing/2010/main" w="9525">
                   <a:solidFill>
                     <a:srgbClr val="000000"/>
                   </a:solidFill>
@@ -5304,7 +5304,7 @@
             </a:ln>
             <a:extLst>
               <a:ext uri="{91240B29-F687-4f45-9708-019B960494DF}">
-                <a14:hiddenLine xmlns:a14="http://schemas.microsoft.com/office/drawing/2010/main" xmlns="" w="9525">
+                <a14:hiddenLine xmlns="" xmlns:a14="http://schemas.microsoft.com/office/drawing/2010/main" w="9525">
                   <a:solidFill>
                     <a:srgbClr val="000000"/>
                   </a:solidFill>
@@ -5394,7 +5394,7 @@
             </a:ln>
             <a:extLst>
               <a:ext uri="{91240B29-F687-4f45-9708-019B960494DF}">
-                <a14:hiddenLine xmlns:a14="http://schemas.microsoft.com/office/drawing/2010/main" xmlns="" w="9525">
+                <a14:hiddenLine xmlns="" xmlns:a14="http://schemas.microsoft.com/office/drawing/2010/main" w="9525">
                   <a:solidFill>
                     <a:srgbClr val="000000"/>
                   </a:solidFill>
@@ -5484,7 +5484,7 @@
             </a:ln>
             <a:extLst>
               <a:ext uri="{91240B29-F687-4f45-9708-019B960494DF}">
-                <a14:hiddenLine xmlns:a14="http://schemas.microsoft.com/office/drawing/2010/main" xmlns="" w="9525">
+                <a14:hiddenLine xmlns="" xmlns:a14="http://schemas.microsoft.com/office/drawing/2010/main" w="9525">
                   <a:solidFill>
                     <a:srgbClr val="000000"/>
                   </a:solidFill>
@@ -5546,7 +5546,7 @@
             </a:ln>
             <a:extLst>
               <a:ext uri="{91240B29-F687-4f45-9708-019B960494DF}">
-                <a14:hiddenLine xmlns:a14="http://schemas.microsoft.com/office/drawing/2010/main" xmlns="" w="9525">
+                <a14:hiddenLine xmlns="" xmlns:a14="http://schemas.microsoft.com/office/drawing/2010/main" w="9525">
                   <a:solidFill>
                     <a:srgbClr val="000000"/>
                   </a:solidFill>
@@ -5636,7 +5636,7 @@
             </a:ln>
             <a:extLst>
               <a:ext uri="{91240B29-F687-4f45-9708-019B960494DF}">
-                <a14:hiddenLine xmlns:a14="http://schemas.microsoft.com/office/drawing/2010/main" xmlns="" w="9525">
+                <a14:hiddenLine xmlns="" xmlns:a14="http://schemas.microsoft.com/office/drawing/2010/main" w="9525">
                   <a:solidFill>
                     <a:srgbClr val="000000"/>
                   </a:solidFill>
@@ -5726,7 +5726,7 @@
             </a:ln>
             <a:extLst>
               <a:ext uri="{91240B29-F687-4f45-9708-019B960494DF}">
-                <a14:hiddenLine xmlns:a14="http://schemas.microsoft.com/office/drawing/2010/main" xmlns="" w="9525">
+                <a14:hiddenLine xmlns="" xmlns:a14="http://schemas.microsoft.com/office/drawing/2010/main" w="9525">
                   <a:solidFill>
                     <a:srgbClr val="000000"/>
                   </a:solidFill>
@@ -5782,7 +5782,7 @@
             </a:ln>
             <a:extLst>
               <a:ext uri="{91240B29-F687-4f45-9708-019B960494DF}">
-                <a14:hiddenLine xmlns:a14="http://schemas.microsoft.com/office/drawing/2010/main" xmlns="" w="9525">
+                <a14:hiddenLine xmlns="" xmlns:a14="http://schemas.microsoft.com/office/drawing/2010/main" w="9525">
                   <a:solidFill>
                     <a:srgbClr val="000000"/>
                   </a:solidFill>
@@ -5872,7 +5872,7 @@
             </a:ln>
             <a:extLst>
               <a:ext uri="{91240B29-F687-4f45-9708-019B960494DF}">
-                <a14:hiddenLine xmlns:a14="http://schemas.microsoft.com/office/drawing/2010/main" xmlns="" w="9525">
+                <a14:hiddenLine xmlns="" xmlns:a14="http://schemas.microsoft.com/office/drawing/2010/main" w="9525">
                   <a:solidFill>
                     <a:srgbClr val="000000"/>
                   </a:solidFill>
@@ -5928,7 +5928,7 @@
             </a:ln>
             <a:extLst>
               <a:ext uri="{91240B29-F687-4f45-9708-019B960494DF}">
-                <a14:hiddenLine xmlns:a14="http://schemas.microsoft.com/office/drawing/2010/main" xmlns="" w="9525">
+                <a14:hiddenLine xmlns="" xmlns:a14="http://schemas.microsoft.com/office/drawing/2010/main" w="9525">
                   <a:solidFill>
                     <a:srgbClr val="000000"/>
                   </a:solidFill>
@@ -6018,7 +6018,7 @@
             </a:ln>
             <a:extLst>
               <a:ext uri="{91240B29-F687-4f45-9708-019B960494DF}">
-                <a14:hiddenLine xmlns:a14="http://schemas.microsoft.com/office/drawing/2010/main" xmlns="" w="9525">
+                <a14:hiddenLine xmlns="" xmlns:a14="http://schemas.microsoft.com/office/drawing/2010/main" w="9525">
                   <a:solidFill>
                     <a:srgbClr val="000000"/>
                   </a:solidFill>
@@ -6086,7 +6086,7 @@
             </a:ln>
             <a:extLst>
               <a:ext uri="{91240B29-F687-4f45-9708-019B960494DF}">
-                <a14:hiddenLine xmlns:a14="http://schemas.microsoft.com/office/drawing/2010/main" xmlns="" w="9525">
+                <a14:hiddenLine xmlns="" xmlns:a14="http://schemas.microsoft.com/office/drawing/2010/main" w="9525">
                   <a:solidFill>
                     <a:srgbClr val="000000"/>
                   </a:solidFill>
@@ -6176,7 +6176,7 @@
             </a:ln>
             <a:extLst>
               <a:ext uri="{91240B29-F687-4f45-9708-019B960494DF}">
-                <a14:hiddenLine xmlns:a14="http://schemas.microsoft.com/office/drawing/2010/main" xmlns="" w="9525">
+                <a14:hiddenLine xmlns="" xmlns:a14="http://schemas.microsoft.com/office/drawing/2010/main" w="9525">
                   <a:solidFill>
                     <a:srgbClr val="000000"/>
                   </a:solidFill>
@@ -6244,7 +6244,7 @@
             </a:ln>
             <a:extLst>
               <a:ext uri="{91240B29-F687-4f45-9708-019B960494DF}">
-                <a14:hiddenLine xmlns:a14="http://schemas.microsoft.com/office/drawing/2010/main" xmlns="" w="9525">
+                <a14:hiddenLine xmlns="" xmlns:a14="http://schemas.microsoft.com/office/drawing/2010/main" w="9525">
                   <a:solidFill>
                     <a:srgbClr val="000000"/>
                   </a:solidFill>
@@ -6334,7 +6334,7 @@
             </a:ln>
             <a:extLst>
               <a:ext uri="{91240B29-F687-4f45-9708-019B960494DF}">
-                <a14:hiddenLine xmlns:a14="http://schemas.microsoft.com/office/drawing/2010/main" xmlns="" w="9525">
+                <a14:hiddenLine xmlns="" xmlns:a14="http://schemas.microsoft.com/office/drawing/2010/main" w="9525">
                   <a:solidFill>
                     <a:srgbClr val="000000"/>
                   </a:solidFill>
@@ -6368,7 +6368,7 @@
             </a:ln>
             <a:extLst>
               <a:ext uri="{91240B29-F687-4f45-9708-019B960494DF}">
-                <a14:hiddenLine xmlns:a14="http://schemas.microsoft.com/office/drawing/2010/main" xmlns="" w="9525">
+                <a14:hiddenLine xmlns="" xmlns:a14="http://schemas.microsoft.com/office/drawing/2010/main" w="9525">
                   <a:solidFill>
                     <a:srgbClr val="000000"/>
                   </a:solidFill>
@@ -6458,7 +6458,7 @@
             </a:ln>
             <a:extLst>
               <a:ext uri="{91240B29-F687-4f45-9708-019B960494DF}">
-                <a14:hiddenLine xmlns:a14="http://schemas.microsoft.com/office/drawing/2010/main" xmlns="" w="9525">
+                <a14:hiddenLine xmlns="" xmlns:a14="http://schemas.microsoft.com/office/drawing/2010/main" w="9525">
                   <a:solidFill>
                     <a:srgbClr val="000000"/>
                   </a:solidFill>
@@ -6520,7 +6520,7 @@
             </a:ln>
             <a:extLst>
               <a:ext uri="{91240B29-F687-4f45-9708-019B960494DF}">
-                <a14:hiddenLine xmlns:a14="http://schemas.microsoft.com/office/drawing/2010/main" xmlns="" w="9525">
+                <a14:hiddenLine xmlns="" xmlns:a14="http://schemas.microsoft.com/office/drawing/2010/main" w="9525">
                   <a:solidFill>
                     <a:srgbClr val="000000"/>
                   </a:solidFill>
@@ -6582,7 +6582,7 @@
             </a:ln>
             <a:extLst>
               <a:ext uri="{91240B29-F687-4f45-9708-019B960494DF}">
-                <a14:hiddenLine xmlns:a14="http://schemas.microsoft.com/office/drawing/2010/main" xmlns="" w="9525">
+                <a14:hiddenLine xmlns="" xmlns:a14="http://schemas.microsoft.com/office/drawing/2010/main" w="9525">
                   <a:solidFill>
                     <a:srgbClr val="000000"/>
                   </a:solidFill>
@@ -6672,7 +6672,7 @@
             </a:ln>
             <a:extLst>
               <a:ext uri="{91240B29-F687-4f45-9708-019B960494DF}">
-                <a14:hiddenLine xmlns:a14="http://schemas.microsoft.com/office/drawing/2010/main" xmlns="" w="9525">
+                <a14:hiddenLine xmlns="" xmlns:a14="http://schemas.microsoft.com/office/drawing/2010/main" w="9525">
                   <a:solidFill>
                     <a:srgbClr val="000000"/>
                   </a:solidFill>
@@ -6740,7 +6740,7 @@
             </a:ln>
             <a:extLst>
               <a:ext uri="{91240B29-F687-4f45-9708-019B960494DF}">
-                <a14:hiddenLine xmlns:a14="http://schemas.microsoft.com/office/drawing/2010/main" xmlns="" w="9525">
+                <a14:hiddenLine xmlns="" xmlns:a14="http://schemas.microsoft.com/office/drawing/2010/main" w="9525">
                   <a:solidFill>
                     <a:srgbClr val="000000"/>
                   </a:solidFill>
@@ -6802,7 +6802,7 @@
             </a:ln>
             <a:extLst>
               <a:ext uri="{91240B29-F687-4f45-9708-019B960494DF}">
-                <a14:hiddenLine xmlns:a14="http://schemas.microsoft.com/office/drawing/2010/main" xmlns="" w="9525">
+                <a14:hiddenLine xmlns="" xmlns:a14="http://schemas.microsoft.com/office/drawing/2010/main" w="9525">
                   <a:solidFill>
                     <a:srgbClr val="000000"/>
                   </a:solidFill>
@@ -6892,7 +6892,7 @@
             </a:ln>
             <a:extLst>
               <a:ext uri="{91240B29-F687-4f45-9708-019B960494DF}">
-                <a14:hiddenLine xmlns:a14="http://schemas.microsoft.com/office/drawing/2010/main" xmlns="" w="9525">
+                <a14:hiddenLine xmlns="" xmlns:a14="http://schemas.microsoft.com/office/drawing/2010/main" w="9525">
                   <a:solidFill>
                     <a:srgbClr val="000000"/>
                   </a:solidFill>
@@ -6954,7 +6954,7 @@
             </a:ln>
             <a:extLst>
               <a:ext uri="{91240B29-F687-4f45-9708-019B960494DF}">
-                <a14:hiddenLine xmlns:a14="http://schemas.microsoft.com/office/drawing/2010/main" xmlns="" w="9525">
+                <a14:hiddenLine xmlns="" xmlns:a14="http://schemas.microsoft.com/office/drawing/2010/main" w="9525">
                   <a:solidFill>
                     <a:srgbClr val="000000"/>
                   </a:solidFill>
@@ -7044,7 +7044,7 @@
             </a:ln>
             <a:extLst>
               <a:ext uri="{91240B29-F687-4f45-9708-019B960494DF}">
-                <a14:hiddenLine xmlns:a14="http://schemas.microsoft.com/office/drawing/2010/main" xmlns="" w="9525">
+                <a14:hiddenLine xmlns="" xmlns:a14="http://schemas.microsoft.com/office/drawing/2010/main" w="9525">
                   <a:solidFill>
                     <a:srgbClr val="000000"/>
                   </a:solidFill>
@@ -7106,7 +7106,7 @@
             </a:ln>
             <a:extLst>
               <a:ext uri="{91240B29-F687-4f45-9708-019B960494DF}">
-                <a14:hiddenLine xmlns:a14="http://schemas.microsoft.com/office/drawing/2010/main" xmlns="" w="9525">
+                <a14:hiddenLine xmlns="" xmlns:a14="http://schemas.microsoft.com/office/drawing/2010/main" w="9525">
                   <a:solidFill>
                     <a:srgbClr val="000000"/>
                   </a:solidFill>
@@ -7196,7 +7196,7 @@
             </a:ln>
             <a:extLst>
               <a:ext uri="{91240B29-F687-4f45-9708-019B960494DF}">
-                <a14:hiddenLine xmlns:a14="http://schemas.microsoft.com/office/drawing/2010/main" xmlns="" w="9525">
+                <a14:hiddenLine xmlns="" xmlns:a14="http://schemas.microsoft.com/office/drawing/2010/main" w="9525">
                   <a:solidFill>
                     <a:srgbClr val="000000"/>
                   </a:solidFill>
@@ -7230,7 +7230,7 @@
             </a:ln>
             <a:extLst>
               <a:ext uri="{91240B29-F687-4f45-9708-019B960494DF}">
-                <a14:hiddenLine xmlns:a14="http://schemas.microsoft.com/office/drawing/2010/main" xmlns="" w="9525">
+                <a14:hiddenLine xmlns="" xmlns:a14="http://schemas.microsoft.com/office/drawing/2010/main" w="9525">
                   <a:solidFill>
                     <a:srgbClr val="000000"/>
                   </a:solidFill>
@@ -7295,7 +7295,7 @@
             </a:ln>
             <a:extLst>
               <a:ext uri="{91240B29-F687-4f45-9708-019B960494DF}">
-                <a14:hiddenLine xmlns:a14="http://schemas.microsoft.com/office/drawing/2010/main" xmlns="" w="9525">
+                <a14:hiddenLine xmlns="" xmlns:a14="http://schemas.microsoft.com/office/drawing/2010/main" w="9525">
                   <a:solidFill>
                     <a:srgbClr val="000000"/>
                   </a:solidFill>
@@ -7385,7 +7385,7 @@
             </a:ln>
             <a:extLst>
               <a:ext uri="{91240B29-F687-4f45-9708-019B960494DF}">
-                <a14:hiddenLine xmlns:a14="http://schemas.microsoft.com/office/drawing/2010/main" xmlns="" w="9525">
+                <a14:hiddenLine xmlns="" xmlns:a14="http://schemas.microsoft.com/office/drawing/2010/main" w="9525">
                   <a:solidFill>
                     <a:srgbClr val="000000"/>
                   </a:solidFill>
@@ -7447,7 +7447,7 @@
             </a:ln>
             <a:extLst>
               <a:ext uri="{91240B29-F687-4f45-9708-019B960494DF}">
-                <a14:hiddenLine xmlns:a14="http://schemas.microsoft.com/office/drawing/2010/main" xmlns="" w="9525">
+                <a14:hiddenLine xmlns="" xmlns:a14="http://schemas.microsoft.com/office/drawing/2010/main" w="9525">
                   <a:solidFill>
                     <a:srgbClr val="000000"/>
                   </a:solidFill>
@@ -7537,7 +7537,7 @@
             </a:ln>
             <a:extLst>
               <a:ext uri="{91240B29-F687-4f45-9708-019B960494DF}">
-                <a14:hiddenLine xmlns:a14="http://schemas.microsoft.com/office/drawing/2010/main" xmlns="" w="9525">
+                <a14:hiddenLine xmlns="" xmlns:a14="http://schemas.microsoft.com/office/drawing/2010/main" w="9525">
                   <a:solidFill>
                     <a:srgbClr val="000000"/>
                   </a:solidFill>
@@ -7627,7 +7627,7 @@
             </a:ln>
             <a:extLst>
               <a:ext uri="{91240B29-F687-4f45-9708-019B960494DF}">
-                <a14:hiddenLine xmlns:a14="http://schemas.microsoft.com/office/drawing/2010/main" xmlns="" w="9525">
+                <a14:hiddenLine xmlns="" xmlns:a14="http://schemas.microsoft.com/office/drawing/2010/main" w="9525">
                   <a:solidFill>
                     <a:srgbClr val="000000"/>
                   </a:solidFill>
@@ -7692,7 +7692,7 @@
             </a:ln>
             <a:extLst>
               <a:ext uri="{91240B29-F687-4f45-9708-019B960494DF}">
-                <a14:hiddenLine xmlns:a14="http://schemas.microsoft.com/office/drawing/2010/main" xmlns="" w="9525">
+                <a14:hiddenLine xmlns="" xmlns:a14="http://schemas.microsoft.com/office/drawing/2010/main" w="9525">
                   <a:solidFill>
                     <a:srgbClr val="000000"/>
                   </a:solidFill>
@@ -7754,7 +7754,7 @@
             </a:ln>
             <a:extLst>
               <a:ext uri="{91240B29-F687-4f45-9708-019B960494DF}">
-                <a14:hiddenLine xmlns:a14="http://schemas.microsoft.com/office/drawing/2010/main" xmlns="" w="9525">
+                <a14:hiddenLine xmlns="" xmlns:a14="http://schemas.microsoft.com/office/drawing/2010/main" w="9525">
                   <a:solidFill>
                     <a:srgbClr val="000000"/>
                   </a:solidFill>
@@ -7844,7 +7844,7 @@
             </a:ln>
             <a:extLst>
               <a:ext uri="{91240B29-F687-4f45-9708-019B960494DF}">
-                <a14:hiddenLine xmlns:a14="http://schemas.microsoft.com/office/drawing/2010/main" xmlns="" w="9525">
+                <a14:hiddenLine xmlns="" xmlns:a14="http://schemas.microsoft.com/office/drawing/2010/main" w="9525">
                   <a:solidFill>
                     <a:srgbClr val="000000"/>
                   </a:solidFill>
@@ -7934,7 +7934,7 @@
             </a:ln>
             <a:extLst>
               <a:ext uri="{91240B29-F687-4f45-9708-019B960494DF}">
-                <a14:hiddenLine xmlns:a14="http://schemas.microsoft.com/office/drawing/2010/main" xmlns="" w="9525">
+                <a14:hiddenLine xmlns="" xmlns:a14="http://schemas.microsoft.com/office/drawing/2010/main" w="9525">
                   <a:solidFill>
                     <a:srgbClr val="000000"/>
                   </a:solidFill>
@@ -7996,7 +7996,7 @@
             </a:ln>
             <a:extLst>
               <a:ext uri="{91240B29-F687-4f45-9708-019B960494DF}">
-                <a14:hiddenLine xmlns:a14="http://schemas.microsoft.com/office/drawing/2010/main" xmlns="" w="9525">
+                <a14:hiddenLine xmlns="" xmlns:a14="http://schemas.microsoft.com/office/drawing/2010/main" w="9525">
                   <a:solidFill>
                     <a:srgbClr val="000000"/>
                   </a:solidFill>
@@ -8116,7 +8116,7 @@
             </a:ln>
             <a:extLst>
               <a:ext uri="{91240B29-F687-4f45-9708-019B960494DF}">
-                <a14:hiddenLine xmlns:a14="http://schemas.microsoft.com/office/drawing/2010/main" xmlns="" w="9525">
+                <a14:hiddenLine xmlns="" xmlns:a14="http://schemas.microsoft.com/office/drawing/2010/main" w="9525">
                   <a:solidFill>
                     <a:srgbClr val="000000"/>
                   </a:solidFill>
@@ -8184,7 +8184,7 @@
             </a:ln>
             <a:extLst>
               <a:ext uri="{91240B29-F687-4f45-9708-019B960494DF}">
-                <a14:hiddenLine xmlns:a14="http://schemas.microsoft.com/office/drawing/2010/main" xmlns="" w="9525">
+                <a14:hiddenLine xmlns="" xmlns:a14="http://schemas.microsoft.com/office/drawing/2010/main" w="9525">
                   <a:solidFill>
                     <a:srgbClr val="000000"/>
                   </a:solidFill>
@@ -8274,7 +8274,7 @@
             </a:ln>
             <a:extLst>
               <a:ext uri="{91240B29-F687-4f45-9708-019B960494DF}">
-                <a14:hiddenLine xmlns:a14="http://schemas.microsoft.com/office/drawing/2010/main" xmlns="" w="9525">
+                <a14:hiddenLine xmlns="" xmlns:a14="http://schemas.microsoft.com/office/drawing/2010/main" w="9525">
                   <a:solidFill>
                     <a:srgbClr val="000000"/>
                   </a:solidFill>
@@ -11690,27 +11690,26 @@
       </p:sp>
       <p:pic>
         <p:nvPicPr>
-          <p:cNvPr id="7" name="Image 6" descr="Description : Description : C:\Patrick\TAF\Visuel\Photoshop\Logo 25 ans\Propal\VF\Propal 15.4 png.png"/>
+          <p:cNvPr id="7" name="Image 6"/>
           <p:cNvPicPr/>
           <p:nvPr userDrawn="1"/>
         </p:nvPicPr>
         <p:blipFill>
-          <a:blip r:embed="rId2" r:link="rId3">
+          <a:blip r:embed="rId2">
             <a:extLst>
               <a:ext uri="{28A0092B-C50C-407E-A947-70E740481C1C}">
                 <a14:useLocalDpi xmlns:a14="http://schemas.microsoft.com/office/drawing/2010/main" val="0"/>
               </a:ext>
             </a:extLst>
           </a:blip>
-          <a:srcRect/>
           <a:stretch>
             <a:fillRect/>
           </a:stretch>
         </p:blipFill>
         <p:spPr bwMode="auto">
           <a:xfrm>
-            <a:off x="119062" y="58738"/>
-            <a:ext cx="720000" cy="720000"/>
+            <a:off x="123894" y="58738"/>
+            <a:ext cx="710335" cy="720000"/>
           </a:xfrm>
           <a:prstGeom prst="rect">
             <a:avLst/>
@@ -11728,7 +11727,7 @@
           <p:nvPr userDrawn="1"/>
         </p:nvPicPr>
         <p:blipFill>
-          <a:blip r:embed="rId4">
+          <a:blip r:embed="rId3">
             <a:extLst>
               <a:ext uri="{28A0092B-C50C-407E-A947-70E740481C1C}">
                 <a14:useLocalDpi xmlns:a14="http://schemas.microsoft.com/office/drawing/2010/main" val="0"/>
@@ -13873,7 +13872,7 @@
           <a:noFill/>
           <a:extLst>
             <a:ext uri="{909E8E84-426E-40dd-AFC4-6F175D3DCCD1}">
-              <a14:hiddenFill xmlns:a14="http://schemas.microsoft.com/office/drawing/2010/main" xmlns="">
+              <a14:hiddenFill xmlns="" xmlns:a14="http://schemas.microsoft.com/office/drawing/2010/main">
                 <a:solidFill>
                   <a:srgbClr val="FFFFFF"/>
                 </a:solidFill>
@@ -13947,7 +13946,7 @@
               </a:ln>
               <a:extLst>
                 <a:ext uri="{91240B29-F687-4f45-9708-019B960494DF}">
-                  <a14:hiddenLine xmlns:a14="http://schemas.microsoft.com/office/drawing/2010/main" xmlns="" w="9525">
+                  <a14:hiddenLine xmlns="" xmlns:a14="http://schemas.microsoft.com/office/drawing/2010/main" w="9525">
                     <a:solidFill>
                       <a:srgbClr val="000000"/>
                     </a:solidFill>
@@ -14037,7 +14036,7 @@
               </a:ln>
               <a:extLst>
                 <a:ext uri="{91240B29-F687-4f45-9708-019B960494DF}">
-                  <a14:hiddenLine xmlns:a14="http://schemas.microsoft.com/office/drawing/2010/main" xmlns="" w="9525">
+                  <a14:hiddenLine xmlns="" xmlns:a14="http://schemas.microsoft.com/office/drawing/2010/main" w="9525">
                     <a:solidFill>
                       <a:srgbClr val="000000"/>
                     </a:solidFill>
@@ -14127,7 +14126,7 @@
               </a:ln>
               <a:extLst>
                 <a:ext uri="{91240B29-F687-4f45-9708-019B960494DF}">
-                  <a14:hiddenLine xmlns:a14="http://schemas.microsoft.com/office/drawing/2010/main" xmlns="" w="9525">
+                  <a14:hiddenLine xmlns="" xmlns:a14="http://schemas.microsoft.com/office/drawing/2010/main" w="9525">
                     <a:solidFill>
                       <a:srgbClr val="000000"/>
                     </a:solidFill>
@@ -14189,7 +14188,7 @@
               </a:ln>
               <a:extLst>
                 <a:ext uri="{91240B29-F687-4f45-9708-019B960494DF}">
-                  <a14:hiddenLine xmlns:a14="http://schemas.microsoft.com/office/drawing/2010/main" xmlns="" w="9525">
+                  <a14:hiddenLine xmlns="" xmlns:a14="http://schemas.microsoft.com/office/drawing/2010/main" w="9525">
                     <a:solidFill>
                       <a:srgbClr val="000000"/>
                     </a:solidFill>
@@ -14279,7 +14278,7 @@
               </a:ln>
               <a:extLst>
                 <a:ext uri="{91240B29-F687-4f45-9708-019B960494DF}">
-                  <a14:hiddenLine xmlns:a14="http://schemas.microsoft.com/office/drawing/2010/main" xmlns="" w="9525">
+                  <a14:hiddenLine xmlns="" xmlns:a14="http://schemas.microsoft.com/office/drawing/2010/main" w="9525">
                     <a:solidFill>
                       <a:srgbClr val="000000"/>
                     </a:solidFill>
@@ -14341,7 +14340,7 @@
               </a:ln>
               <a:extLst>
                 <a:ext uri="{91240B29-F687-4f45-9708-019B960494DF}">
-                  <a14:hiddenLine xmlns:a14="http://schemas.microsoft.com/office/drawing/2010/main" xmlns="" w="9525">
+                  <a14:hiddenLine xmlns="" xmlns:a14="http://schemas.microsoft.com/office/drawing/2010/main" w="9525">
                     <a:solidFill>
                       <a:srgbClr val="000000"/>
                     </a:solidFill>
@@ -14403,7 +14402,7 @@
               </a:ln>
               <a:extLst>
                 <a:ext uri="{91240B29-F687-4f45-9708-019B960494DF}">
-                  <a14:hiddenLine xmlns:a14="http://schemas.microsoft.com/office/drawing/2010/main" xmlns="" w="9525">
+                  <a14:hiddenLine xmlns="" xmlns:a14="http://schemas.microsoft.com/office/drawing/2010/main" w="9525">
                     <a:solidFill>
                       <a:srgbClr val="000000"/>
                     </a:solidFill>
@@ -14493,7 +14492,7 @@
               </a:ln>
               <a:extLst>
                 <a:ext uri="{91240B29-F687-4f45-9708-019B960494DF}">
-                  <a14:hiddenLine xmlns:a14="http://schemas.microsoft.com/office/drawing/2010/main" xmlns="" w="9525">
+                  <a14:hiddenLine xmlns="" xmlns:a14="http://schemas.microsoft.com/office/drawing/2010/main" w="9525">
                     <a:solidFill>
                       <a:srgbClr val="000000"/>
                     </a:solidFill>
@@ -14583,7 +14582,7 @@
               </a:ln>
               <a:extLst>
                 <a:ext uri="{91240B29-F687-4f45-9708-019B960494DF}">
-                  <a14:hiddenLine xmlns:a14="http://schemas.microsoft.com/office/drawing/2010/main" xmlns="" w="9525">
+                  <a14:hiddenLine xmlns="" xmlns:a14="http://schemas.microsoft.com/office/drawing/2010/main" w="9525">
                     <a:solidFill>
                       <a:srgbClr val="000000"/>
                     </a:solidFill>
@@ -14645,7 +14644,7 @@
               </a:ln>
               <a:extLst>
                 <a:ext uri="{91240B29-F687-4f45-9708-019B960494DF}">
-                  <a14:hiddenLine xmlns:a14="http://schemas.microsoft.com/office/drawing/2010/main" xmlns="" w="9525">
+                  <a14:hiddenLine xmlns="" xmlns:a14="http://schemas.microsoft.com/office/drawing/2010/main" w="9525">
                     <a:solidFill>
                       <a:srgbClr val="000000"/>
                     </a:solidFill>
@@ -14755,7 +14754,7 @@
               </a:ln>
               <a:extLst>
                 <a:ext uri="{91240B29-F687-4f45-9708-019B960494DF}">
-                  <a14:hiddenLine xmlns:a14="http://schemas.microsoft.com/office/drawing/2010/main" xmlns="" w="9525">
+                  <a14:hiddenLine xmlns="" xmlns:a14="http://schemas.microsoft.com/office/drawing/2010/main" w="9525">
                     <a:solidFill>
                       <a:srgbClr val="000000"/>
                     </a:solidFill>
@@ -14839,7 +14838,7 @@
               </a:ln>
               <a:extLst>
                 <a:ext uri="{91240B29-F687-4f45-9708-019B960494DF}">
-                  <a14:hiddenLine xmlns:a14="http://schemas.microsoft.com/office/drawing/2010/main" xmlns="" w="9525">
+                  <a14:hiddenLine xmlns="" xmlns:a14="http://schemas.microsoft.com/office/drawing/2010/main" w="9525">
                     <a:solidFill>
                       <a:srgbClr val="000000"/>
                     </a:solidFill>
@@ -14901,7 +14900,7 @@
               </a:ln>
               <a:extLst>
                 <a:ext uri="{91240B29-F687-4f45-9708-019B960494DF}">
-                  <a14:hiddenLine xmlns:a14="http://schemas.microsoft.com/office/drawing/2010/main" xmlns="" w="9525">
+                  <a14:hiddenLine xmlns="" xmlns:a14="http://schemas.microsoft.com/office/drawing/2010/main" w="9525">
                     <a:solidFill>
                       <a:srgbClr val="000000"/>
                     </a:solidFill>
@@ -14963,7 +14962,7 @@
               </a:ln>
               <a:extLst>
                 <a:ext uri="{91240B29-F687-4f45-9708-019B960494DF}">
-                  <a14:hiddenLine xmlns:a14="http://schemas.microsoft.com/office/drawing/2010/main" xmlns="" w="9525">
+                  <a14:hiddenLine xmlns="" xmlns:a14="http://schemas.microsoft.com/office/drawing/2010/main" w="9525">
                     <a:solidFill>
                       <a:srgbClr val="000000"/>
                     </a:solidFill>
@@ -15053,7 +15052,7 @@
               </a:ln>
               <a:extLst>
                 <a:ext uri="{91240B29-F687-4f45-9708-019B960494DF}">
-                  <a14:hiddenLine xmlns:a14="http://schemas.microsoft.com/office/drawing/2010/main" xmlns="" w="9525">
+                  <a14:hiddenLine xmlns="" xmlns:a14="http://schemas.microsoft.com/office/drawing/2010/main" w="9525">
                     <a:solidFill>
                       <a:srgbClr val="000000"/>
                     </a:solidFill>
@@ -15087,7 +15086,7 @@
               </a:ln>
               <a:extLst>
                 <a:ext uri="{91240B29-F687-4f45-9708-019B960494DF}">
-                  <a14:hiddenLine xmlns:a14="http://schemas.microsoft.com/office/drawing/2010/main" xmlns="" w="9525">
+                  <a14:hiddenLine xmlns="" xmlns:a14="http://schemas.microsoft.com/office/drawing/2010/main" w="9525">
                     <a:solidFill>
                       <a:srgbClr val="000000"/>
                     </a:solidFill>
@@ -15152,7 +15151,7 @@
               </a:ln>
               <a:extLst>
                 <a:ext uri="{91240B29-F687-4f45-9708-019B960494DF}">
-                  <a14:hiddenLine xmlns:a14="http://schemas.microsoft.com/office/drawing/2010/main" xmlns="" w="9525">
+                  <a14:hiddenLine xmlns="" xmlns:a14="http://schemas.microsoft.com/office/drawing/2010/main" w="9525">
                     <a:solidFill>
                       <a:srgbClr val="000000"/>
                     </a:solidFill>
@@ -15242,7 +15241,7 @@
               </a:ln>
               <a:extLst>
                 <a:ext uri="{91240B29-F687-4f45-9708-019B960494DF}">
-                  <a14:hiddenLine xmlns:a14="http://schemas.microsoft.com/office/drawing/2010/main" xmlns="" w="9525">
+                  <a14:hiddenLine xmlns="" xmlns:a14="http://schemas.microsoft.com/office/drawing/2010/main" w="9525">
                     <a:solidFill>
                       <a:srgbClr val="000000"/>
                     </a:solidFill>
@@ -15304,7 +15303,7 @@
               </a:ln>
               <a:extLst>
                 <a:ext uri="{91240B29-F687-4f45-9708-019B960494DF}">
-                  <a14:hiddenLine xmlns:a14="http://schemas.microsoft.com/office/drawing/2010/main" xmlns="" w="9525">
+                  <a14:hiddenLine xmlns="" xmlns:a14="http://schemas.microsoft.com/office/drawing/2010/main" w="9525">
                     <a:solidFill>
                       <a:srgbClr val="000000"/>
                     </a:solidFill>
@@ -15394,7 +15393,7 @@
               </a:ln>
               <a:extLst>
                 <a:ext uri="{91240B29-F687-4f45-9708-019B960494DF}">
-                  <a14:hiddenLine xmlns:a14="http://schemas.microsoft.com/office/drawing/2010/main" xmlns="" w="9525">
+                  <a14:hiddenLine xmlns="" xmlns:a14="http://schemas.microsoft.com/office/drawing/2010/main" w="9525">
                     <a:solidFill>
                       <a:srgbClr val="000000"/>
                     </a:solidFill>
@@ -15459,7 +15458,7 @@
               </a:ln>
               <a:extLst>
                 <a:ext uri="{91240B29-F687-4f45-9708-019B960494DF}">
-                  <a14:hiddenLine xmlns:a14="http://schemas.microsoft.com/office/drawing/2010/main" xmlns="" w="9525">
+                  <a14:hiddenLine xmlns="" xmlns:a14="http://schemas.microsoft.com/office/drawing/2010/main" w="9525">
                     <a:solidFill>
                       <a:srgbClr val="000000"/>
                     </a:solidFill>
@@ -15521,7 +15520,7 @@
               </a:ln>
               <a:extLst>
                 <a:ext uri="{91240B29-F687-4f45-9708-019B960494DF}">
-                  <a14:hiddenLine xmlns:a14="http://schemas.microsoft.com/office/drawing/2010/main" xmlns="" w="9525">
+                  <a14:hiddenLine xmlns="" xmlns:a14="http://schemas.microsoft.com/office/drawing/2010/main" w="9525">
                     <a:solidFill>
                       <a:srgbClr val="000000"/>
                     </a:solidFill>
@@ -15611,7 +15610,7 @@
               </a:ln>
               <a:extLst>
                 <a:ext uri="{91240B29-F687-4f45-9708-019B960494DF}">
-                  <a14:hiddenLine xmlns:a14="http://schemas.microsoft.com/office/drawing/2010/main" xmlns="" w="9525">
+                  <a14:hiddenLine xmlns="" xmlns:a14="http://schemas.microsoft.com/office/drawing/2010/main" w="9525">
                     <a:solidFill>
                       <a:srgbClr val="000000"/>
                     </a:solidFill>
@@ -15701,7 +15700,7 @@
               </a:ln>
               <a:extLst>
                 <a:ext uri="{91240B29-F687-4f45-9708-019B960494DF}">
-                  <a14:hiddenLine xmlns:a14="http://schemas.microsoft.com/office/drawing/2010/main" xmlns="" w="9525">
+                  <a14:hiddenLine xmlns="" xmlns:a14="http://schemas.microsoft.com/office/drawing/2010/main" w="9525">
                     <a:solidFill>
                       <a:srgbClr val="000000"/>
                     </a:solidFill>
@@ -15766,7 +15765,7 @@
               </a:ln>
               <a:extLst>
                 <a:ext uri="{91240B29-F687-4f45-9708-019B960494DF}">
-                  <a14:hiddenLine xmlns:a14="http://schemas.microsoft.com/office/drawing/2010/main" xmlns="" w="9525">
+                  <a14:hiddenLine xmlns="" xmlns:a14="http://schemas.microsoft.com/office/drawing/2010/main" w="9525">
                     <a:solidFill>
                       <a:srgbClr val="000000"/>
                     </a:solidFill>
@@ -15886,7 +15885,7 @@
               </a:ln>
               <a:extLst>
                 <a:ext uri="{91240B29-F687-4f45-9708-019B960494DF}">
-                  <a14:hiddenLine xmlns:a14="http://schemas.microsoft.com/office/drawing/2010/main" xmlns="" w="9525">
+                  <a14:hiddenLine xmlns="" xmlns:a14="http://schemas.microsoft.com/office/drawing/2010/main" w="9525">
                     <a:solidFill>
                       <a:srgbClr val="000000"/>
                     </a:solidFill>
@@ -15967,7 +15966,7 @@
               </a:ln>
               <a:extLst>
                 <a:ext uri="{91240B29-F687-4f45-9708-019B960494DF}">
-                  <a14:hiddenLine xmlns:a14="http://schemas.microsoft.com/office/drawing/2010/main" xmlns="" w="9525">
+                  <a14:hiddenLine xmlns="" xmlns:a14="http://schemas.microsoft.com/office/drawing/2010/main" w="9525">
                     <a:solidFill>
                       <a:srgbClr val="000000"/>
                     </a:solidFill>
@@ -16082,7 +16081,7 @@
               </a:ln>
               <a:extLst>
                 <a:ext uri="{91240B29-F687-4f45-9708-019B960494DF}">
-                  <a14:hiddenLine xmlns:a14="http://schemas.microsoft.com/office/drawing/2010/main" xmlns="" w="9525">
+                  <a14:hiddenLine xmlns="" xmlns:a14="http://schemas.microsoft.com/office/drawing/2010/main" w="9525">
                     <a:solidFill>
                       <a:srgbClr val="000000"/>
                     </a:solidFill>
@@ -16172,7 +16171,7 @@
               </a:ln>
               <a:extLst>
                 <a:ext uri="{91240B29-F687-4f45-9708-019B960494DF}">
-                  <a14:hiddenLine xmlns:a14="http://schemas.microsoft.com/office/drawing/2010/main" xmlns="" w="9525">
+                  <a14:hiddenLine xmlns="" xmlns:a14="http://schemas.microsoft.com/office/drawing/2010/main" w="9525">
                     <a:solidFill>
                       <a:srgbClr val="000000"/>
                     </a:solidFill>
@@ -16237,7 +16236,7 @@
               </a:ln>
               <a:extLst>
                 <a:ext uri="{91240B29-F687-4f45-9708-019B960494DF}">
-                  <a14:hiddenLine xmlns:a14="http://schemas.microsoft.com/office/drawing/2010/main" xmlns="" w="9525">
+                  <a14:hiddenLine xmlns="" xmlns:a14="http://schemas.microsoft.com/office/drawing/2010/main" w="9525">
                     <a:solidFill>
                       <a:srgbClr val="000000"/>
                     </a:solidFill>
@@ -16327,7 +16326,7 @@
               </a:ln>
               <a:extLst>
                 <a:ext uri="{91240B29-F687-4f45-9708-019B960494DF}">
-                  <a14:hiddenLine xmlns:a14="http://schemas.microsoft.com/office/drawing/2010/main" xmlns="" w="9525">
+                  <a14:hiddenLine xmlns="" xmlns:a14="http://schemas.microsoft.com/office/drawing/2010/main" w="9525">
                     <a:solidFill>
                       <a:srgbClr val="000000"/>
                     </a:solidFill>
@@ -16395,7 +16394,7 @@
               </a:ln>
               <a:extLst>
                 <a:ext uri="{91240B29-F687-4f45-9708-019B960494DF}">
-                  <a14:hiddenLine xmlns:a14="http://schemas.microsoft.com/office/drawing/2010/main" xmlns="" w="9525">
+                  <a14:hiddenLine xmlns="" xmlns:a14="http://schemas.microsoft.com/office/drawing/2010/main" w="9525">
                     <a:solidFill>
                       <a:srgbClr val="000000"/>
                     </a:solidFill>
@@ -16485,7 +16484,7 @@
               </a:ln>
               <a:extLst>
                 <a:ext uri="{91240B29-F687-4f45-9708-019B960494DF}">
-                  <a14:hiddenLine xmlns:a14="http://schemas.microsoft.com/office/drawing/2010/main" xmlns="" w="9525">
+                  <a14:hiddenLine xmlns="" xmlns:a14="http://schemas.microsoft.com/office/drawing/2010/main" w="9525">
                     <a:solidFill>
                       <a:srgbClr val="000000"/>
                     </a:solidFill>
@@ -16553,7 +16552,7 @@
               </a:ln>
               <a:extLst>
                 <a:ext uri="{91240B29-F687-4f45-9708-019B960494DF}">
-                  <a14:hiddenLine xmlns:a14="http://schemas.microsoft.com/office/drawing/2010/main" xmlns="" w="9525">
+                  <a14:hiddenLine xmlns="" xmlns:a14="http://schemas.microsoft.com/office/drawing/2010/main" w="9525">
                     <a:solidFill>
                       <a:srgbClr val="000000"/>
                     </a:solidFill>
@@ -16643,7 +16642,7 @@
               </a:ln>
               <a:extLst>
                 <a:ext uri="{91240B29-F687-4f45-9708-019B960494DF}">
-                  <a14:hiddenLine xmlns:a14="http://schemas.microsoft.com/office/drawing/2010/main" xmlns="" w="9525">
+                  <a14:hiddenLine xmlns="" xmlns:a14="http://schemas.microsoft.com/office/drawing/2010/main" w="9525">
                     <a:solidFill>
                       <a:srgbClr val="000000"/>
                     </a:solidFill>
@@ -16677,7 +16676,7 @@
               </a:ln>
               <a:extLst>
                 <a:ext uri="{91240B29-F687-4f45-9708-019B960494DF}">
-                  <a14:hiddenLine xmlns:a14="http://schemas.microsoft.com/office/drawing/2010/main" xmlns="" w="9525">
+                  <a14:hiddenLine xmlns="" xmlns:a14="http://schemas.microsoft.com/office/drawing/2010/main" w="9525">
                     <a:solidFill>
                       <a:srgbClr val="000000"/>
                     </a:solidFill>
@@ -17247,7 +17246,7 @@
           <p:cNvPr id="2" name="Titre 1">
             <a:extLst>
               <a:ext uri="{FF2B5EF4-FFF2-40B4-BE49-F238E27FC236}">
-                <a16:creationId xmlns="" xmlns:a16="http://schemas.microsoft.com/office/drawing/2014/main" id="{8268D3E5-C7A3-47DF-A374-46BF83A69904}"/>
+                <a16:creationId xmlns:a16="http://schemas.microsoft.com/office/drawing/2014/main" xmlns="" id="{8268D3E5-C7A3-47DF-A374-46BF83A69904}"/>
               </a:ext>
             </a:extLst>
           </p:cNvPr>
@@ -18924,17 +18923,7 @@
                   </a:solidFill>
                 </a:ln>
               </a:rPr>
-              <a:t>Comment télécharger un document sur la </a:t>
-            </a:r>
-            <a:r>
-              <a:rPr lang="fr-FR" b="1" dirty="0">
-                <a:ln>
-                  <a:solidFill>
-                    <a:schemeClr val="bg1"/>
-                  </a:solidFill>
-                </a:ln>
-              </a:rPr>
-              <a:t>plateforme</a:t>
+              <a:t>Comment télécharger un document sur la plateforme</a:t>
             </a:r>
           </a:p>
         </p:txBody>
@@ -19176,17 +19165,7 @@
                   </a:solidFill>
                 </a:ln>
               </a:rPr>
-              <a:t>Comment télécharger un document sur la </a:t>
-            </a:r>
-            <a:r>
-              <a:rPr lang="fr-FR" b="1" dirty="0">
-                <a:ln>
-                  <a:solidFill>
-                    <a:schemeClr val="bg1"/>
-                  </a:solidFill>
-                </a:ln>
-              </a:rPr>
-              <a:t>plateforme</a:t>
+              <a:t>Comment télécharger un document sur la plateforme</a:t>
             </a:r>
           </a:p>
         </p:txBody>
@@ -21400,7 +21379,7 @@
           <p:cNvPr id="2" name="Titre 1">
             <a:extLst>
               <a:ext uri="{FF2B5EF4-FFF2-40B4-BE49-F238E27FC236}">
-                <a16:creationId xmlns="" xmlns:a16="http://schemas.microsoft.com/office/drawing/2014/main" id="{34DB6CE4-2B13-4715-B5B2-615A55922CA1}"/>
+                <a16:creationId xmlns:a16="http://schemas.microsoft.com/office/drawing/2014/main" xmlns="" id="{34DB6CE4-2B13-4715-B5B2-615A55922CA1}"/>
               </a:ext>
             </a:extLst>
           </p:cNvPr>
@@ -22680,7 +22659,7 @@
           <p:cNvPr id="3" name="Losange 11">
             <a:extLst>
               <a:ext uri="{FF2B5EF4-FFF2-40B4-BE49-F238E27FC236}">
-                <a16:creationId xmlns:a16="http://schemas.microsoft.com/office/drawing/2014/main" xmlns="" id="{7DC8B409-5FAC-4539-B25A-26BE925A48AF}"/>
+                <a16:creationId xmlns="" xmlns:a16="http://schemas.microsoft.com/office/drawing/2014/main" id="{7DC8B409-5FAC-4539-B25A-26BE925A48AF}"/>
               </a:ext>
             </a:extLst>
           </p:cNvPr>
@@ -22732,7 +22711,7 @@
           <p:cNvPr id="4" name="Losange 12">
             <a:extLst>
               <a:ext uri="{FF2B5EF4-FFF2-40B4-BE49-F238E27FC236}">
-                <a16:creationId xmlns:a16="http://schemas.microsoft.com/office/drawing/2014/main" xmlns="" id="{91498E2F-539C-46D3-AF7C-BB1DAE76B114}"/>
+                <a16:creationId xmlns="" xmlns:a16="http://schemas.microsoft.com/office/drawing/2014/main" id="{91498E2F-539C-46D3-AF7C-BB1DAE76B114}"/>
               </a:ext>
             </a:extLst>
           </p:cNvPr>
@@ -22784,7 +22763,7 @@
           <p:cNvPr id="5" name="Titre 1">
             <a:extLst>
               <a:ext uri="{FF2B5EF4-FFF2-40B4-BE49-F238E27FC236}">
-                <a16:creationId xmlns:a16="http://schemas.microsoft.com/office/drawing/2014/main" xmlns="" id="{FA061601-468D-486D-B8EE-42BD1BE3ADCC}"/>
+                <a16:creationId xmlns="" xmlns:a16="http://schemas.microsoft.com/office/drawing/2014/main" id="{FA061601-468D-486D-B8EE-42BD1BE3ADCC}"/>
               </a:ext>
             </a:extLst>
           </p:cNvPr>

</xml_diff>